<commit_message>
Azure RTOS unit and execise update
</commit_message>
<xml_diff>
--- a/learn-pr/student-evangelism/develop-secure-iot-solutions-azure-sphere-iot-central/media/intercore-coms.pptx
+++ b/learn-pr/student-evangelism/develop-secure-iot-solutions-azure-sphere-iot-central/media/intercore-coms.pptx
@@ -197,7 +197,7 @@
           <a:p>
             <a:fld id="{8C880108-91E3-4FBD-8C21-59A6DA93D497}" type="datetimeFigureOut">
               <a:rPr lang="en-AU" smtClean="0"/>
-              <a:t>2/11/2020</a:t>
+              <a:t>10/11/2020</a:t>
             </a:fld>
             <a:endParaRPr lang="en-AU"/>
           </a:p>
@@ -12777,7 +12777,7 @@
             <a:fld id="{B3D10869-6060-4E47-B931-1432A5FBCBE3}" type="datetimeFigureOut">
               <a:rPr lang="en-US" smtClean="0"/>
               <a:pPr/>
-              <a:t>11/2/2020</a:t>
+              <a:t>11/10/2020</a:t>
             </a:fld>
             <a:endParaRPr lang="en-US"/>
           </a:p>
@@ -18498,22 +18498,30 @@
               <a:defRPr/>
             </a:pPr>
             <a:r>
-              <a:rPr kumimoji="0" lang="en-AU" sz="1100" b="0" i="0" u="none" strike="noStrike" kern="0" cap="none" spc="0" normalizeH="0" baseline="0" noProof="0">
-                <a:ln>
-                  <a:noFill/>
-                </a:ln>
+              <a:rPr lang="en-US" sz="1100" kern="0" dirty="0">
                 <a:solidFill>
                   <a:prstClr val="white"/>
                 </a:solidFill>
-                <a:effectLst/>
-                <a:uLnTx/>
-                <a:uFillTx/>
                 <a:latin typeface="Calibri" panose="020F0502020204030204" pitchFamily="34" charset="0"/>
                 <a:ea typeface="Verdana" panose="020B0604030504040204" pitchFamily="34" charset="0"/>
                 <a:cs typeface="Calibri" panose="020F0502020204030204" pitchFamily="34" charset="0"/>
               </a:rPr>
-              <a:t>1</a:t>
-            </a:r>
+              <a:t>5</a:t>
+            </a:r>
+            <a:endParaRPr kumimoji="0" lang="en-AU" sz="1100" b="0" i="0" u="none" strike="noStrike" kern="0" cap="none" spc="0" normalizeH="0" baseline="0" noProof="0" dirty="0">
+              <a:ln>
+                <a:noFill/>
+              </a:ln>
+              <a:solidFill>
+                <a:prstClr val="white"/>
+              </a:solidFill>
+              <a:effectLst/>
+              <a:uLnTx/>
+              <a:uFillTx/>
+              <a:latin typeface="Calibri" panose="020F0502020204030204" pitchFamily="34" charset="0"/>
+              <a:ea typeface="Verdana" panose="020B0604030504040204" pitchFamily="34" charset="0"/>
+              <a:cs typeface="Calibri" panose="020F0502020204030204" pitchFamily="34" charset="0"/>
+            </a:endParaRPr>
           </a:p>
         </p:txBody>
       </p:sp>
@@ -18679,7 +18687,7 @@
         </p:nvSpPr>
         <p:spPr>
           <a:xfrm>
-            <a:off x="5694329" y="3454724"/>
+            <a:off x="5254800" y="3074455"/>
             <a:ext cx="256674" cy="248652"/>
           </a:xfrm>
           <a:prstGeom prst="ellipse">
@@ -18723,22 +18731,30 @@
               <a:defRPr/>
             </a:pPr>
             <a:r>
-              <a:rPr kumimoji="0" lang="en-AU" sz="1100" b="0" i="0" u="none" strike="noStrike" kern="0" cap="none" spc="0" normalizeH="0" baseline="0" noProof="0" dirty="0">
-                <a:ln>
-                  <a:noFill/>
-                </a:ln>
+              <a:rPr lang="en-US" sz="1100" kern="0" dirty="0">
                 <a:solidFill>
                   <a:prstClr val="white"/>
                 </a:solidFill>
-                <a:effectLst/>
-                <a:uLnTx/>
-                <a:uFillTx/>
                 <a:latin typeface="Calibri" panose="020F0502020204030204" pitchFamily="34" charset="0"/>
                 <a:ea typeface="Verdana" panose="020B0604030504040204" pitchFamily="34" charset="0"/>
                 <a:cs typeface="Calibri" panose="020F0502020204030204" pitchFamily="34" charset="0"/>
               </a:rPr>
-              <a:t>2</a:t>
-            </a:r>
+              <a:t>4</a:t>
+            </a:r>
+            <a:endParaRPr kumimoji="0" lang="en-AU" sz="1100" b="0" i="0" u="none" strike="noStrike" kern="0" cap="none" spc="0" normalizeH="0" baseline="0" noProof="0" dirty="0">
+              <a:ln>
+                <a:noFill/>
+              </a:ln>
+              <a:solidFill>
+                <a:prstClr val="white"/>
+              </a:solidFill>
+              <a:effectLst/>
+              <a:uLnTx/>
+              <a:uFillTx/>
+              <a:latin typeface="Calibri" panose="020F0502020204030204" pitchFamily="34" charset="0"/>
+              <a:ea typeface="Verdana" panose="020B0604030504040204" pitchFamily="34" charset="0"/>
+              <a:cs typeface="Calibri" panose="020F0502020204030204" pitchFamily="34" charset="0"/>
+            </a:endParaRPr>
           </a:p>
         </p:txBody>
       </p:sp>
@@ -18976,7 +18992,7 @@
                 <a:latin typeface="Calibri" panose="020F0502020204030204" pitchFamily="34" charset="0"/>
                 <a:cs typeface="Calibri" panose="020F0502020204030204" pitchFamily="34" charset="0"/>
               </a:rPr>
-              <a:t>Environment telemetry service thread</a:t>
+              <a:t>Environment service thread</a:t>
             </a:r>
           </a:p>
         </p:txBody>
@@ -19050,7 +19066,7 @@
                 <a:latin typeface="Calibri" panose="020F0502020204030204" pitchFamily="34" charset="0"/>
                 <a:cs typeface="Calibri" panose="020F0502020204030204" pitchFamily="34" charset="0"/>
               </a:rPr>
-              <a:t>Environment telemetry sense thread</a:t>
+              <a:t>Environment sensor thread</a:t>
             </a:r>
             <a:endParaRPr kumimoji="0" lang="en-AU" sz="1200" b="0" i="0" u="none" strike="noStrike" kern="1200" cap="none" spc="0" normalizeH="0" baseline="0" noProof="0" dirty="0">
               <a:ln>
@@ -19486,7 +19502,7 @@
         </p:nvSpPr>
         <p:spPr>
           <a:xfrm>
-            <a:off x="7437385" y="3284881"/>
+            <a:off x="7185044" y="3156378"/>
             <a:ext cx="256674" cy="248652"/>
           </a:xfrm>
           <a:prstGeom prst="ellipse">
@@ -19530,22 +19546,30 @@
               <a:defRPr/>
             </a:pPr>
             <a:r>
-              <a:rPr kumimoji="0" lang="en-AU" sz="1100" b="0" i="0" u="none" strike="noStrike" kern="0" cap="none" spc="0" normalizeH="0" baseline="0" noProof="0" dirty="0">
-                <a:ln>
-                  <a:noFill/>
-                </a:ln>
+              <a:rPr lang="en-US" sz="1100" kern="0" dirty="0">
                 <a:solidFill>
                   <a:prstClr val="white"/>
                 </a:solidFill>
-                <a:effectLst/>
-                <a:uLnTx/>
-                <a:uFillTx/>
                 <a:latin typeface="Calibri" panose="020F0502020204030204" pitchFamily="34" charset="0"/>
                 <a:ea typeface="Verdana" panose="020B0604030504040204" pitchFamily="34" charset="0"/>
                 <a:cs typeface="Calibri" panose="020F0502020204030204" pitchFamily="34" charset="0"/>
               </a:rPr>
-              <a:t>3</a:t>
-            </a:r>
+              <a:t>2</a:t>
+            </a:r>
+            <a:endParaRPr kumimoji="0" lang="en-AU" sz="1100" b="0" i="0" u="none" strike="noStrike" kern="0" cap="none" spc="0" normalizeH="0" baseline="0" noProof="0" dirty="0">
+              <a:ln>
+                <a:noFill/>
+              </a:ln>
+              <a:solidFill>
+                <a:prstClr val="white"/>
+              </a:solidFill>
+              <a:effectLst/>
+              <a:uLnTx/>
+              <a:uFillTx/>
+              <a:latin typeface="Calibri" panose="020F0502020204030204" pitchFamily="34" charset="0"/>
+              <a:ea typeface="Verdana" panose="020B0604030504040204" pitchFamily="34" charset="0"/>
+              <a:cs typeface="Calibri" panose="020F0502020204030204" pitchFamily="34" charset="0"/>
+            </a:endParaRPr>
           </a:p>
         </p:txBody>
       </p:sp>
@@ -19563,7 +19587,7 @@
         </p:nvSpPr>
         <p:spPr>
           <a:xfrm>
-            <a:off x="5694097" y="4828472"/>
+            <a:off x="7168904" y="4485873"/>
             <a:ext cx="256674" cy="248652"/>
           </a:xfrm>
           <a:prstGeom prst="ellipse">
@@ -19607,22 +19631,30 @@
               <a:defRPr/>
             </a:pPr>
             <a:r>
-              <a:rPr kumimoji="0" lang="en-AU" sz="1100" b="0" i="0" u="none" strike="noStrike" kern="0" cap="none" spc="0" normalizeH="0" baseline="0" noProof="0" dirty="0">
-                <a:ln>
-                  <a:noFill/>
-                </a:ln>
+              <a:rPr lang="en-US" sz="1100" kern="0" dirty="0">
                 <a:solidFill>
                   <a:prstClr val="white"/>
                 </a:solidFill>
-                <a:effectLst/>
-                <a:uLnTx/>
-                <a:uFillTx/>
                 <a:latin typeface="Calibri" panose="020F0502020204030204" pitchFamily="34" charset="0"/>
                 <a:ea typeface="Verdana" panose="020B0604030504040204" pitchFamily="34" charset="0"/>
                 <a:cs typeface="Calibri" panose="020F0502020204030204" pitchFamily="34" charset="0"/>
               </a:rPr>
-              <a:t>5</a:t>
-            </a:r>
+              <a:t>7</a:t>
+            </a:r>
+            <a:endParaRPr kumimoji="0" lang="en-AU" sz="1100" b="0" i="0" u="none" strike="noStrike" kern="0" cap="none" spc="0" normalizeH="0" baseline="0" noProof="0" dirty="0">
+              <a:ln>
+                <a:noFill/>
+              </a:ln>
+              <a:solidFill>
+                <a:prstClr val="white"/>
+              </a:solidFill>
+              <a:effectLst/>
+              <a:uLnTx/>
+              <a:uFillTx/>
+              <a:latin typeface="Calibri" panose="020F0502020204030204" pitchFamily="34" charset="0"/>
+              <a:ea typeface="Verdana" panose="020B0604030504040204" pitchFamily="34" charset="0"/>
+              <a:cs typeface="Calibri" panose="020F0502020204030204" pitchFamily="34" charset="0"/>
+            </a:endParaRPr>
           </a:p>
         </p:txBody>
       </p:sp>
@@ -19745,7 +19777,7 @@
         </p:nvSpPr>
         <p:spPr>
           <a:xfrm>
-            <a:off x="8127184" y="3284881"/>
+            <a:off x="9464553" y="3146028"/>
             <a:ext cx="256674" cy="248652"/>
           </a:xfrm>
           <a:prstGeom prst="ellipse">
@@ -19803,7 +19835,7 @@
                 <a:ea typeface="Verdana" panose="020B0604030504040204" pitchFamily="34" charset="0"/>
                 <a:cs typeface="Calibri" panose="020F0502020204030204" pitchFamily="34" charset="0"/>
               </a:rPr>
-              <a:t>4</a:t>
+              <a:t>3</a:t>
             </a:r>
           </a:p>
         </p:txBody>
@@ -19938,6 +19970,83 @@
           </a:prstGeom>
         </p:spPr>
       </p:pic>
+      <p:sp>
+        <p:nvSpPr>
+          <p:cNvPr id="6" name="Oval 5">
+            <a:extLst>
+              <a:ext uri="{FF2B5EF4-FFF2-40B4-BE49-F238E27FC236}">
+                <a16:creationId xmlns:a16="http://schemas.microsoft.com/office/drawing/2014/main" id="{6651AD79-8AB0-4A78-93C8-4E0DBC6B4F62}"/>
+              </a:ext>
+            </a:extLst>
+          </p:cNvPr>
+          <p:cNvSpPr/>
+          <p:nvPr/>
+        </p:nvSpPr>
+        <p:spPr>
+          <a:xfrm>
+            <a:off x="9455290" y="4426339"/>
+            <a:ext cx="256674" cy="248652"/>
+          </a:xfrm>
+          <a:prstGeom prst="ellipse">
+            <a:avLst/>
+          </a:prstGeom>
+          <a:solidFill>
+            <a:srgbClr val="5B9BD5">
+              <a:lumMod val="75000"/>
+            </a:srgbClr>
+          </a:solidFill>
+          <a:ln w="12700" cap="flat" cmpd="sng" algn="ctr">
+            <a:solidFill>
+              <a:srgbClr val="4472C4">
+                <a:shade val="50000"/>
+              </a:srgbClr>
+            </a:solidFill>
+            <a:prstDash val="solid"/>
+            <a:miter lim="800000"/>
+          </a:ln>
+          <a:effectLst/>
+        </p:spPr>
+        <p:txBody>
+          <a:bodyPr rtlCol="0" anchor="ctr"/>
+          <a:lstStyle/>
+          <a:p>
+            <a:pPr marL="0" marR="0" lvl="0" indent="0" algn="ctr" defTabSz="914400" rtl="0" eaLnBrk="1" fontAlgn="auto" latinLnBrk="0" hangingPunct="1">
+              <a:lnSpc>
+                <a:spcPct val="100000"/>
+              </a:lnSpc>
+              <a:spcBef>
+                <a:spcPts val="0"/>
+              </a:spcBef>
+              <a:spcAft>
+                <a:spcPts val="0"/>
+              </a:spcAft>
+              <a:buClrTx/>
+              <a:buSzTx/>
+              <a:buFontTx/>
+              <a:buNone/>
+              <a:tabLst/>
+              <a:defRPr/>
+            </a:pPr>
+            <a:r>
+              <a:rPr kumimoji="0" lang="en-AU" sz="1100" b="0" i="0" u="none" strike="noStrike" kern="0" cap="none" spc="0" normalizeH="0" baseline="0" noProof="0">
+                <a:ln>
+                  <a:noFill/>
+                </a:ln>
+                <a:solidFill>
+                  <a:prstClr val="white"/>
+                </a:solidFill>
+                <a:effectLst/>
+                <a:uLnTx/>
+                <a:uFillTx/>
+                <a:latin typeface="Calibri" panose="020F0502020204030204" pitchFamily="34" charset="0"/>
+                <a:ea typeface="Verdana" panose="020B0604030504040204" pitchFamily="34" charset="0"/>
+                <a:cs typeface="Calibri" panose="020F0502020204030204" pitchFamily="34" charset="0"/>
+              </a:rPr>
+              <a:t>1</a:t>
+            </a:r>
+          </a:p>
+        </p:txBody>
+      </p:sp>
     </p:spTree>
     <p:extLst>
       <p:ext uri="{BB962C8B-B14F-4D97-AF65-F5344CB8AC3E}">

</xml_diff>